<commit_message>
presentation lab meeting :)
</commit_message>
<xml_diff>
--- a/Meetings/February_14th_2024.pptx
+++ b/Meetings/February_14th_2024.pptx
@@ -9,10 +9,10 @@
     <p:sldId id="257" r:id="rId3"/>
     <p:sldId id="261" r:id="rId4"/>
     <p:sldId id="262" r:id="rId5"/>
-    <p:sldId id="264" r:id="rId6"/>
-    <p:sldId id="263" r:id="rId7"/>
-    <p:sldId id="258" r:id="rId8"/>
-    <p:sldId id="259" r:id="rId9"/>
+    <p:sldId id="265" r:id="rId6"/>
+    <p:sldId id="266" r:id="rId7"/>
+    <p:sldId id="263" r:id="rId8"/>
+    <p:sldId id="258" r:id="rId9"/>
     <p:sldId id="260" r:id="rId10"/>
   </p:sldIdLst>
   <p:sldSz cx="12192000" cy="6858000"/>
@@ -112,6 +112,11 @@
       </a:defRPr>
     </a:lvl9pPr>
   </p:defaultTextStyle>
+  <p:extLst>
+    <p:ext uri="{EFAFB233-063F-42B5-8137-9DF3F51BA10A}">
+      <p15:sldGuideLst xmlns:p15="http://schemas.microsoft.com/office/powerpoint/2012/main"/>
+    </p:ext>
+  </p:extLst>
 </p:presentation>
 </file>
 
@@ -262,7 +267,7 @@
           <a:p>
             <a:fld id="{8D84556A-21ED-4471-A065-C163CAB7D837}" type="datetimeFigureOut">
               <a:rPr lang="en-US" smtClean="0"/>
-              <a:t>2/8/2024</a:t>
+              <a:t>2/10/2024</a:t>
             </a:fld>
             <a:endParaRPr lang="en-US"/>
           </a:p>
@@ -460,7 +465,7 @@
           <a:p>
             <a:fld id="{8D84556A-21ED-4471-A065-C163CAB7D837}" type="datetimeFigureOut">
               <a:rPr lang="en-US" smtClean="0"/>
-              <a:t>2/8/2024</a:t>
+              <a:t>2/10/2024</a:t>
             </a:fld>
             <a:endParaRPr lang="en-US"/>
           </a:p>
@@ -668,7 +673,7 @@
           <a:p>
             <a:fld id="{8D84556A-21ED-4471-A065-C163CAB7D837}" type="datetimeFigureOut">
               <a:rPr lang="en-US" smtClean="0"/>
-              <a:t>2/8/2024</a:t>
+              <a:t>2/10/2024</a:t>
             </a:fld>
             <a:endParaRPr lang="en-US"/>
           </a:p>
@@ -866,7 +871,7 @@
           <a:p>
             <a:fld id="{8D84556A-21ED-4471-A065-C163CAB7D837}" type="datetimeFigureOut">
               <a:rPr lang="en-US" smtClean="0"/>
-              <a:t>2/8/2024</a:t>
+              <a:t>2/10/2024</a:t>
             </a:fld>
             <a:endParaRPr lang="en-US"/>
           </a:p>
@@ -1141,7 +1146,7 @@
           <a:p>
             <a:fld id="{8D84556A-21ED-4471-A065-C163CAB7D837}" type="datetimeFigureOut">
               <a:rPr lang="en-US" smtClean="0"/>
-              <a:t>2/8/2024</a:t>
+              <a:t>2/10/2024</a:t>
             </a:fld>
             <a:endParaRPr lang="en-US"/>
           </a:p>
@@ -1406,7 +1411,7 @@
           <a:p>
             <a:fld id="{8D84556A-21ED-4471-A065-C163CAB7D837}" type="datetimeFigureOut">
               <a:rPr lang="en-US" smtClean="0"/>
-              <a:t>2/8/2024</a:t>
+              <a:t>2/10/2024</a:t>
             </a:fld>
             <a:endParaRPr lang="en-US"/>
           </a:p>
@@ -1818,7 +1823,7 @@
           <a:p>
             <a:fld id="{8D84556A-21ED-4471-A065-C163CAB7D837}" type="datetimeFigureOut">
               <a:rPr lang="en-US" smtClean="0"/>
-              <a:t>2/8/2024</a:t>
+              <a:t>2/10/2024</a:t>
             </a:fld>
             <a:endParaRPr lang="en-US"/>
           </a:p>
@@ -1959,7 +1964,7 @@
           <a:p>
             <a:fld id="{8D84556A-21ED-4471-A065-C163CAB7D837}" type="datetimeFigureOut">
               <a:rPr lang="en-US" smtClean="0"/>
-              <a:t>2/8/2024</a:t>
+              <a:t>2/10/2024</a:t>
             </a:fld>
             <a:endParaRPr lang="en-US"/>
           </a:p>
@@ -2072,7 +2077,7 @@
           <a:p>
             <a:fld id="{8D84556A-21ED-4471-A065-C163CAB7D837}" type="datetimeFigureOut">
               <a:rPr lang="en-US" smtClean="0"/>
-              <a:t>2/8/2024</a:t>
+              <a:t>2/10/2024</a:t>
             </a:fld>
             <a:endParaRPr lang="en-US"/>
           </a:p>
@@ -2383,7 +2388,7 @@
           <a:p>
             <a:fld id="{8D84556A-21ED-4471-A065-C163CAB7D837}" type="datetimeFigureOut">
               <a:rPr lang="en-US" smtClean="0"/>
-              <a:t>2/8/2024</a:t>
+              <a:t>2/10/2024</a:t>
             </a:fld>
             <a:endParaRPr lang="en-US"/>
           </a:p>
@@ -2671,7 +2676,7 @@
           <a:p>
             <a:fld id="{8D84556A-21ED-4471-A065-C163CAB7D837}" type="datetimeFigureOut">
               <a:rPr lang="en-US" smtClean="0"/>
-              <a:t>2/8/2024</a:t>
+              <a:t>2/10/2024</a:t>
             </a:fld>
             <a:endParaRPr lang="en-US"/>
           </a:p>
@@ -2912,7 +2917,7 @@
           <a:p>
             <a:fld id="{8D84556A-21ED-4471-A065-C163CAB7D837}" type="datetimeFigureOut">
               <a:rPr lang="en-US" smtClean="0"/>
-              <a:t>2/8/2024</a:t>
+              <a:t>2/10/2024</a:t>
             </a:fld>
             <a:endParaRPr lang="en-US"/>
           </a:p>
@@ -3455,7 +3460,9 @@
         </p:nvSpPr>
         <p:spPr/>
         <p:txBody>
-          <a:bodyPr/>
+          <a:bodyPr>
+            <a:normAutofit lnSpcReduction="10000"/>
+          </a:bodyPr>
           <a:lstStyle/>
           <a:p>
             <a:pPr marL="514350" indent="-514350">
@@ -3463,25 +3470,73 @@
             </a:pPr>
             <a:r>
               <a:rPr lang="en-US" dirty="0"/>
-              <a:t>Mosaic videos with zero-crossing</a:t>
-            </a:r>
-          </a:p>
-          <a:p>
-            <a:pPr marL="514350" indent="-514350">
-              <a:buAutoNum type="arabicPeriod"/>
+              <a:t>Mosaics with zero-crossing</a:t>
+            </a:r>
+          </a:p>
+          <a:p>
+            <a:pPr marL="0" indent="0">
+              <a:buNone/>
             </a:pPr>
             <a:r>
               <a:rPr lang="en-US" dirty="0"/>
-              <a:t>Ran experiment at GPU memory limit</a:t>
-            </a:r>
-          </a:p>
-          <a:p>
-            <a:pPr marL="514350" indent="-514350">
-              <a:buAutoNum type="arabicPeriod"/>
+              <a:t>Discovered that we can get a full mosaic by “fusing” 2 types! </a:t>
+            </a:r>
+          </a:p>
+          <a:p>
+            <a:pPr marL="0" indent="0">
+              <a:buNone/>
             </a:pPr>
+            <a:endParaRPr lang="en-US" dirty="0"/>
+          </a:p>
+          <a:p>
+            <a:pPr marL="0" indent="0">
+              <a:buNone/>
+            </a:pPr>
             <a:r>
               <a:rPr lang="en-US" dirty="0"/>
-              <a:t>Fixed an important bug: Parameters were not initialized randomly</a:t>
+              <a:t>3. Fixed an important bug: Parameters were not initialized randomly</a:t>
+            </a:r>
+          </a:p>
+          <a:p>
+            <a:pPr marL="0" indent="0">
+              <a:buNone/>
+            </a:pPr>
+            <a:endParaRPr lang="en-US" dirty="0"/>
+          </a:p>
+          <a:p>
+            <a:pPr marL="0" indent="0">
+              <a:buNone/>
+            </a:pPr>
+            <a:r>
+              <a:rPr lang="en-US" dirty="0"/>
+              <a:t>3. Talk about GPU memory limit</a:t>
+            </a:r>
+          </a:p>
+          <a:p>
+            <a:pPr marL="0" indent="0">
+              <a:buNone/>
+            </a:pPr>
+            <a:r>
+              <a:rPr lang="en-US" dirty="0"/>
+              <a:t>4. Higher learning rate? </a:t>
+            </a:r>
+          </a:p>
+          <a:p>
+            <a:pPr marL="0" indent="0">
+              <a:buNone/>
+            </a:pPr>
+            <a:r>
+              <a:rPr lang="en-US" dirty="0"/>
+              <a:t>2. Looking back at 500 neurons 12x12x3 </a:t>
+            </a:r>
+          </a:p>
+          <a:p>
+            <a:pPr marL="0" indent="0">
+              <a:buNone/>
+            </a:pPr>
+            <a:r>
+              <a:rPr lang="en-US" dirty="0"/>
+              <a:t>Looking back at PCA splits: Neurons encode individual cone inputs</a:t>
             </a:r>
           </a:p>
           <a:p>
@@ -3635,56 +3690,6 @@
           <a:chExt cx="0" cy="0"/>
         </a:xfrm>
       </p:grpSpPr>
-      <p:sp>
-        <p:nvSpPr>
-          <p:cNvPr id="2" name="Title 1">
-            <a:extLst>
-              <a:ext uri="{FF2B5EF4-FFF2-40B4-BE49-F238E27FC236}">
-                <a16:creationId xmlns:a16="http://schemas.microsoft.com/office/drawing/2014/main" id="{E95CCA97-B957-E2A2-972C-9A2CFB233AB9}"/>
-              </a:ext>
-            </a:extLst>
-          </p:cNvPr>
-          <p:cNvSpPr>
-            <a:spLocks noGrp="1"/>
-          </p:cNvSpPr>
-          <p:nvPr>
-            <p:ph type="title"/>
-          </p:nvPr>
-        </p:nvSpPr>
-        <p:spPr/>
-        <p:txBody>
-          <a:bodyPr/>
-          <a:lstStyle/>
-          <a:p>
-            <a:endParaRPr lang="en-US" dirty="0"/>
-          </a:p>
-        </p:txBody>
-      </p:sp>
-      <p:sp>
-        <p:nvSpPr>
-          <p:cNvPr id="3" name="Content Placeholder 2">
-            <a:extLst>
-              <a:ext uri="{FF2B5EF4-FFF2-40B4-BE49-F238E27FC236}">
-                <a16:creationId xmlns:a16="http://schemas.microsoft.com/office/drawing/2014/main" id="{EF5AE3EC-F5DB-5E04-084D-8068132E23E1}"/>
-              </a:ext>
-            </a:extLst>
-          </p:cNvPr>
-          <p:cNvSpPr>
-            <a:spLocks noGrp="1"/>
-          </p:cNvSpPr>
-          <p:nvPr>
-            <p:ph idx="1"/>
-          </p:nvPr>
-        </p:nvSpPr>
-        <p:spPr/>
-        <p:txBody>
-          <a:bodyPr/>
-          <a:lstStyle/>
-          <a:p>
-            <a:endParaRPr lang="en-US"/>
-          </a:p>
-        </p:txBody>
-      </p:sp>
       <p:pic>
         <p:nvPicPr>
           <p:cNvPr id="5" name="Picture 4">
@@ -3715,6 +3720,117 @@
           </a:prstGeom>
         </p:spPr>
       </p:pic>
+      <p:sp>
+        <p:nvSpPr>
+          <p:cNvPr id="4" name="TextBox 3">
+            <a:extLst>
+              <a:ext uri="{FF2B5EF4-FFF2-40B4-BE49-F238E27FC236}">
+                <a16:creationId xmlns:a16="http://schemas.microsoft.com/office/drawing/2014/main" id="{EA31FD3C-AEF0-F28B-1B96-D6C11B8AAEE4}"/>
+              </a:ext>
+            </a:extLst>
+          </p:cNvPr>
+          <p:cNvSpPr txBox="1"/>
+          <p:nvPr/>
+        </p:nvSpPr>
+        <p:spPr>
+          <a:xfrm>
+            <a:off x="3380015" y="4619901"/>
+            <a:ext cx="5265964" cy="954107"/>
+          </a:xfrm>
+          <a:prstGeom prst="rect">
+            <a:avLst/>
+          </a:prstGeom>
+          <a:noFill/>
+        </p:spPr>
+        <p:txBody>
+          <a:bodyPr wrap="square" rtlCol="0">
+            <a:spAutoFit/>
+          </a:bodyPr>
+          <a:lstStyle/>
+          <a:p>
+            <a:r>
+              <a:rPr lang="en-US" sz="2800" b="1" dirty="0"/>
+              <a:t>Mosaics 2 and 3 “complement” each other!!! </a:t>
+            </a:r>
+          </a:p>
+        </p:txBody>
+      </p:sp>
+      <p:sp>
+        <p:nvSpPr>
+          <p:cNvPr id="6" name="TextBox 5">
+            <a:extLst>
+              <a:ext uri="{FF2B5EF4-FFF2-40B4-BE49-F238E27FC236}">
+                <a16:creationId xmlns:a16="http://schemas.microsoft.com/office/drawing/2014/main" id="{BCB968C7-20D8-EB1F-BEA0-1732017B623C}"/>
+              </a:ext>
+            </a:extLst>
+          </p:cNvPr>
+          <p:cNvSpPr txBox="1"/>
+          <p:nvPr/>
+        </p:nvSpPr>
+        <p:spPr>
+          <a:xfrm>
+            <a:off x="3922938" y="5792561"/>
+            <a:ext cx="4114800" cy="646331"/>
+          </a:xfrm>
+          <a:prstGeom prst="rect">
+            <a:avLst/>
+          </a:prstGeom>
+          <a:noFill/>
+        </p:spPr>
+        <p:txBody>
+          <a:bodyPr wrap="square" rtlCol="0">
+            <a:spAutoFit/>
+          </a:bodyPr>
+          <a:lstStyle/>
+          <a:p>
+            <a:r>
+              <a:rPr lang="en-US" dirty="0"/>
+              <a:t>Mosaic 2: OFF midget</a:t>
+            </a:r>
+          </a:p>
+          <a:p>
+            <a:r>
+              <a:rPr lang="en-US" dirty="0"/>
+              <a:t>Mosaic 3: OFF midget + OFF S inputs </a:t>
+            </a:r>
+          </a:p>
+        </p:txBody>
+      </p:sp>
+      <p:sp>
+        <p:nvSpPr>
+          <p:cNvPr id="7" name="TextBox 6">
+            <a:extLst>
+              <a:ext uri="{FF2B5EF4-FFF2-40B4-BE49-F238E27FC236}">
+                <a16:creationId xmlns:a16="http://schemas.microsoft.com/office/drawing/2014/main" id="{CFCBA954-90B7-5124-89FD-50BA396B6CF3}"/>
+              </a:ext>
+            </a:extLst>
+          </p:cNvPr>
+          <p:cNvSpPr txBox="1"/>
+          <p:nvPr/>
+        </p:nvSpPr>
+        <p:spPr>
+          <a:xfrm>
+            <a:off x="9005207" y="5866039"/>
+            <a:ext cx="2212522" cy="369332"/>
+          </a:xfrm>
+          <a:prstGeom prst="rect">
+            <a:avLst/>
+          </a:prstGeom>
+          <a:noFill/>
+        </p:spPr>
+        <p:txBody>
+          <a:bodyPr wrap="square" rtlCol="0">
+            <a:spAutoFit/>
+          </a:bodyPr>
+          <a:lstStyle/>
+          <a:p>
+            <a:r>
+              <a:rPr lang="en-US" dirty="0"/>
+              <a:t>240125-183448</a:t>
+            </a:r>
+          </a:p>
+        </p:txBody>
+      </p:sp>
     </p:spTree>
     <p:extLst>
       <p:ext uri="{BB962C8B-B14F-4D97-AF65-F5344CB8AC3E}">
@@ -3750,7 +3866,7 @@
           <p:cNvPr id="2" name="Title 1">
             <a:extLst>
               <a:ext uri="{FF2B5EF4-FFF2-40B4-BE49-F238E27FC236}">
-                <a16:creationId xmlns:a16="http://schemas.microsoft.com/office/drawing/2014/main" id="{468F54BA-8224-D4EA-D5D1-0FF594BD0E74}"/>
+                <a16:creationId xmlns:a16="http://schemas.microsoft.com/office/drawing/2014/main" id="{3CDBAC43-14E3-7C0E-D42B-03EFA0CC5C60}"/>
               </a:ext>
             </a:extLst>
           </p:cNvPr>
@@ -3768,7 +3884,7 @@
           <a:p>
             <a:r>
               <a:rPr lang="en-US" dirty="0"/>
-              <a:t>Video</a:t>
+              <a:t>Mosaic 2 + Mosaic 3</a:t>
             </a:r>
           </a:p>
         </p:txBody>
@@ -3778,7 +3894,7 @@
           <p:cNvPr id="3" name="Content Placeholder 2">
             <a:extLst>
               <a:ext uri="{FF2B5EF4-FFF2-40B4-BE49-F238E27FC236}">
-                <a16:creationId xmlns:a16="http://schemas.microsoft.com/office/drawing/2014/main" id="{75A77A8B-46E3-DE08-FC07-7464575DCE0C}"/>
+                <a16:creationId xmlns:a16="http://schemas.microsoft.com/office/drawing/2014/main" id="{EBDE7089-F3DA-D349-81ED-FABE30FC8CA5}"/>
               </a:ext>
             </a:extLst>
           </p:cNvPr>
@@ -3794,14 +3910,174 @@
           <a:bodyPr/>
           <a:lstStyle/>
           <a:p>
-            <a:endParaRPr lang="en-US"/>
+            <a:endParaRPr lang="en-US" dirty="0"/>
+          </a:p>
+        </p:txBody>
+      </p:sp>
+      <p:pic>
+        <p:nvPicPr>
+          <p:cNvPr id="7" name="Picture 6">
+            <a:extLst>
+              <a:ext uri="{FF2B5EF4-FFF2-40B4-BE49-F238E27FC236}">
+                <a16:creationId xmlns:a16="http://schemas.microsoft.com/office/drawing/2014/main" id="{BBD42DB1-EBFF-482B-FC31-01A52063C8CE}"/>
+              </a:ext>
+            </a:extLst>
+          </p:cNvPr>
+          <p:cNvPicPr>
+            <a:picLocks noChangeAspect="1"/>
+          </p:cNvPicPr>
+          <p:nvPr/>
+        </p:nvPicPr>
+        <p:blipFill>
+          <a:blip r:embed="rId2"/>
+          <a:stretch>
+            <a:fillRect/>
+          </a:stretch>
+        </p:blipFill>
+        <p:spPr>
+          <a:xfrm>
+            <a:off x="6665755" y="4078961"/>
+            <a:ext cx="3086483" cy="1927451"/>
+          </a:xfrm>
+          <a:prstGeom prst="rect">
+            <a:avLst/>
+          </a:prstGeom>
+        </p:spPr>
+      </p:pic>
+      <p:pic>
+        <p:nvPicPr>
+          <p:cNvPr id="9" name="Picture 8">
+            <a:extLst>
+              <a:ext uri="{FF2B5EF4-FFF2-40B4-BE49-F238E27FC236}">
+                <a16:creationId xmlns:a16="http://schemas.microsoft.com/office/drawing/2014/main" id="{47B2EBDE-7A1A-73A9-7435-DA38FE85A42C}"/>
+              </a:ext>
+            </a:extLst>
+          </p:cNvPr>
+          <p:cNvPicPr>
+            <a:picLocks noChangeAspect="1"/>
+          </p:cNvPicPr>
+          <p:nvPr/>
+        </p:nvPicPr>
+        <p:blipFill>
+          <a:blip r:embed="rId3"/>
+          <a:stretch>
+            <a:fillRect/>
+          </a:stretch>
+        </p:blipFill>
+        <p:spPr>
+          <a:xfrm>
+            <a:off x="947055" y="1825625"/>
+            <a:ext cx="4620988" cy="4597507"/>
+          </a:xfrm>
+          <a:prstGeom prst="rect">
+            <a:avLst/>
+          </a:prstGeom>
+        </p:spPr>
+      </p:pic>
+      <p:pic>
+        <p:nvPicPr>
+          <p:cNvPr id="11" name="Picture 10">
+            <a:extLst>
+              <a:ext uri="{FF2B5EF4-FFF2-40B4-BE49-F238E27FC236}">
+                <a16:creationId xmlns:a16="http://schemas.microsoft.com/office/drawing/2014/main" id="{6797C8DC-E506-E10C-A307-914613D32FCC}"/>
+              </a:ext>
+            </a:extLst>
+          </p:cNvPr>
+          <p:cNvPicPr>
+            <a:picLocks noChangeAspect="1"/>
+          </p:cNvPicPr>
+          <p:nvPr/>
+        </p:nvPicPr>
+        <p:blipFill>
+          <a:blip r:embed="rId4"/>
+          <a:stretch>
+            <a:fillRect/>
+          </a:stretch>
+        </p:blipFill>
+        <p:spPr>
+          <a:xfrm>
+            <a:off x="6840317" y="1401081"/>
+            <a:ext cx="3177072" cy="1804988"/>
+          </a:xfrm>
+          <a:prstGeom prst="rect">
+            <a:avLst/>
+          </a:prstGeom>
+        </p:spPr>
+      </p:pic>
+      <p:sp>
+        <p:nvSpPr>
+          <p:cNvPr id="12" name="TextBox 11">
+            <a:extLst>
+              <a:ext uri="{FF2B5EF4-FFF2-40B4-BE49-F238E27FC236}">
+                <a16:creationId xmlns:a16="http://schemas.microsoft.com/office/drawing/2014/main" id="{0A24DFE2-8A71-D4D4-E013-77E3F2D875A6}"/>
+              </a:ext>
+            </a:extLst>
+          </p:cNvPr>
+          <p:cNvSpPr txBox="1"/>
+          <p:nvPr/>
+        </p:nvSpPr>
+        <p:spPr>
+          <a:xfrm>
+            <a:off x="7385083" y="1136809"/>
+            <a:ext cx="2159454" cy="369332"/>
+          </a:xfrm>
+          <a:prstGeom prst="rect">
+            <a:avLst/>
+          </a:prstGeom>
+          <a:noFill/>
+        </p:spPr>
+        <p:txBody>
+          <a:bodyPr wrap="square" rtlCol="0">
+            <a:spAutoFit/>
+          </a:bodyPr>
+          <a:lstStyle/>
+          <a:p>
+            <a:r>
+              <a:rPr lang="en-US" dirty="0"/>
+              <a:t>Mosaic 2 example:</a:t>
+            </a:r>
+          </a:p>
+        </p:txBody>
+      </p:sp>
+      <p:sp>
+        <p:nvSpPr>
+          <p:cNvPr id="13" name="TextBox 12">
+            <a:extLst>
+              <a:ext uri="{FF2B5EF4-FFF2-40B4-BE49-F238E27FC236}">
+                <a16:creationId xmlns:a16="http://schemas.microsoft.com/office/drawing/2014/main" id="{39670F32-2F3F-9F7C-64E5-60A3383BB680}"/>
+              </a:ext>
+            </a:extLst>
+          </p:cNvPr>
+          <p:cNvSpPr txBox="1"/>
+          <p:nvPr/>
+        </p:nvSpPr>
+        <p:spPr>
+          <a:xfrm>
+            <a:off x="7331528" y="3939712"/>
+            <a:ext cx="2420710" cy="369332"/>
+          </a:xfrm>
+          <a:prstGeom prst="rect">
+            <a:avLst/>
+          </a:prstGeom>
+          <a:noFill/>
+        </p:spPr>
+        <p:txBody>
+          <a:bodyPr wrap="square" rtlCol="0">
+            <a:spAutoFit/>
+          </a:bodyPr>
+          <a:lstStyle/>
+          <a:p>
+            <a:r>
+              <a:rPr lang="en-US" dirty="0"/>
+              <a:t>Mosaic 3 example:</a:t>
+            </a:r>
           </a:p>
         </p:txBody>
       </p:sp>
     </p:spTree>
     <p:extLst>
       <p:ext uri="{BB962C8B-B14F-4D97-AF65-F5344CB8AC3E}">
-        <p14:creationId xmlns:p14="http://schemas.microsoft.com/office/powerpoint/2010/main" val="2077909940"/>
+        <p14:creationId xmlns:p14="http://schemas.microsoft.com/office/powerpoint/2010/main" val="1639513777"/>
       </p:ext>
     </p:extLst>
   </p:cSld>
@@ -3833,7 +4109,7 @@
           <p:cNvPr id="2" name="Title 1">
             <a:extLst>
               <a:ext uri="{FF2B5EF4-FFF2-40B4-BE49-F238E27FC236}">
-                <a16:creationId xmlns:a16="http://schemas.microsoft.com/office/drawing/2014/main" id="{D72FD668-0004-5639-2089-9BE7DBB07204}"/>
+                <a16:creationId xmlns:a16="http://schemas.microsoft.com/office/drawing/2014/main" id="{E8DD8EB0-207E-062A-054D-113123D5EB36}"/>
               </a:ext>
             </a:extLst>
           </p:cNvPr>
@@ -3844,134 +4120,204 @@
             <p:ph type="title"/>
           </p:nvPr>
         </p:nvSpPr>
-        <p:spPr/>
+        <p:spPr>
+          <a:xfrm>
+            <a:off x="752475" y="210004"/>
+            <a:ext cx="10515600" cy="1325563"/>
+          </a:xfrm>
+        </p:spPr>
         <p:txBody>
           <a:bodyPr/>
           <a:lstStyle/>
           <a:p>
             <a:r>
               <a:rPr lang="en-US" dirty="0"/>
-              <a:t>Memory limit</a:t>
-            </a:r>
-          </a:p>
-        </p:txBody>
-      </p:sp>
-      <p:sp>
-        <p:nvSpPr>
-          <p:cNvPr id="3" name="Content Placeholder 2">
-            <a:extLst>
-              <a:ext uri="{FF2B5EF4-FFF2-40B4-BE49-F238E27FC236}">
-                <a16:creationId xmlns:a16="http://schemas.microsoft.com/office/drawing/2014/main" id="{9188BEF5-D2F5-7E7C-6E95-981555CA51AD}"/>
-              </a:ext>
-            </a:extLst>
-          </p:cNvPr>
-          <p:cNvSpPr>
-            <a:spLocks noGrp="1"/>
-          </p:cNvSpPr>
+              <a:t>Video: 300 neurons 18x18x3</a:t>
+            </a:r>
+          </a:p>
+        </p:txBody>
+      </p:sp>
+      <p:pic>
+        <p:nvPicPr>
+          <p:cNvPr id="4" name="mosaic_type">
+            <a:hlinkClick r:id="" action="ppaction://media"/>
+            <a:extLst>
+              <a:ext uri="{FF2B5EF4-FFF2-40B4-BE49-F238E27FC236}">
+                <a16:creationId xmlns:a16="http://schemas.microsoft.com/office/drawing/2014/main" id="{23927218-C0A5-2EE9-CF38-3936D8F73E2C}"/>
+              </a:ext>
+            </a:extLst>
+          </p:cNvPr>
+          <p:cNvPicPr>
+            <a:picLocks noGrp="1" noChangeAspect="1"/>
+          </p:cNvPicPr>
           <p:nvPr>
             <p:ph idx="1"/>
-          </p:nvPr>
-        </p:nvSpPr>
-        <p:spPr/>
-        <p:txBody>
-          <a:bodyPr>
-            <a:normAutofit lnSpcReduction="10000"/>
-          </a:bodyPr>
-          <a:lstStyle/>
-          <a:p>
-            <a:pPr marL="0" indent="0">
-              <a:buNone/>
-            </a:pPr>
-            <a:r>
-              <a:rPr lang="en-US" dirty="0"/>
-              <a:t>What </a:t>
-            </a:r>
-            <a:r>
-              <a:rPr lang="en-US" b="1" dirty="0"/>
-              <a:t>does</a:t>
-            </a:r>
-            <a:r>
-              <a:rPr lang="en-US" dirty="0"/>
-              <a:t> influences the limit:</a:t>
-            </a:r>
-          </a:p>
-          <a:p>
-            <a:pPr marL="0" indent="0">
-              <a:buNone/>
-            </a:pPr>
-            <a:r>
-              <a:rPr lang="en-US" dirty="0"/>
-              <a:t>Number of neurons, batch size</a:t>
-            </a:r>
-          </a:p>
-          <a:p>
-            <a:pPr marL="0" indent="0">
-              <a:buNone/>
-            </a:pPr>
-            <a:endParaRPr lang="en-US" dirty="0"/>
-          </a:p>
-          <a:p>
-            <a:pPr marL="0" indent="0">
-              <a:buNone/>
-            </a:pPr>
-            <a:r>
-              <a:rPr lang="en-US" dirty="0"/>
-              <a:t>What </a:t>
-            </a:r>
-            <a:r>
-              <a:rPr lang="en-US" b="1" dirty="0"/>
-              <a:t>doesn’t</a:t>
-            </a:r>
-            <a:r>
-              <a:rPr lang="en-US" dirty="0"/>
-              <a:t> influence the limit:</a:t>
-            </a:r>
-          </a:p>
-          <a:p>
-            <a:pPr marL="0" indent="0">
-              <a:buNone/>
-            </a:pPr>
-            <a:r>
-              <a:rPr lang="en-US" dirty="0"/>
-              <a:t>Kernel size, number of channels</a:t>
-            </a:r>
-          </a:p>
-          <a:p>
-            <a:pPr marL="0" indent="0">
-              <a:buNone/>
-            </a:pPr>
-            <a:endParaRPr lang="en-US" dirty="0"/>
-          </a:p>
-          <a:p>
-            <a:pPr marL="0" indent="0">
-              <a:buNone/>
-            </a:pPr>
-            <a:r>
-              <a:rPr lang="en-US" dirty="0"/>
-              <a:t>Why is that?</a:t>
-            </a:r>
-          </a:p>
-          <a:p>
-            <a:pPr marL="0" indent="0">
-              <a:buNone/>
-            </a:pPr>
-            <a:r>
-              <a:rPr lang="en-US" i="1" dirty="0"/>
-              <a:t>Ran experiment at limit: 500 neurons, batch size = 128 -&gt; 64, 18x18x3 inputs.  </a:t>
-            </a:r>
-          </a:p>
-        </p:txBody>
-      </p:sp>
+            <a:videoFile r:link="rId2"/>
+            <p:extLst>
+              <p:ext uri="{DAA4B4D4-6D71-4841-9C94-3DE7FCFB9230}">
+                <p14:media xmlns:p14="http://schemas.microsoft.com/office/powerpoint/2010/main" r:embed="rId1"/>
+              </p:ext>
+            </p:extLst>
+          </p:nvPr>
+        </p:nvPicPr>
+        <p:blipFill>
+          <a:blip r:embed="rId4"/>
+          <a:stretch>
+            <a:fillRect/>
+          </a:stretch>
+        </p:blipFill>
+        <p:spPr>
+          <a:xfrm>
+            <a:off x="889907" y="1297442"/>
+            <a:ext cx="9626131" cy="5299302"/>
+          </a:xfrm>
+        </p:spPr>
+      </p:pic>
     </p:spTree>
     <p:extLst>
       <p:ext uri="{BB962C8B-B14F-4D97-AF65-F5344CB8AC3E}">
-        <p14:creationId xmlns:p14="http://schemas.microsoft.com/office/powerpoint/2010/main" val="1932711536"/>
+        <p14:creationId xmlns:p14="http://schemas.microsoft.com/office/powerpoint/2010/main" val="325229208"/>
       </p:ext>
     </p:extLst>
   </p:cSld>
   <p:clrMapOvr>
     <a:masterClrMapping/>
   </p:clrMapOvr>
+  <p:timing>
+    <p:tnLst>
+      <p:par>
+        <p:cTn id="1" dur="indefinite" restart="never" nodeType="tmRoot">
+          <p:childTnLst>
+            <p:seq concurrent="1" nextAc="seek">
+              <p:cTn id="2" dur="indefinite" nodeType="mainSeq">
+                <p:childTnLst>
+                  <p:par>
+                    <p:cTn id="3" fill="hold">
+                      <p:stCondLst>
+                        <p:cond delay="indefinite"/>
+                      </p:stCondLst>
+                      <p:childTnLst>
+                        <p:par>
+                          <p:cTn id="4" fill="hold">
+                            <p:stCondLst>
+                              <p:cond delay="0"/>
+                            </p:stCondLst>
+                            <p:childTnLst>
+                              <p:par>
+                                <p:cTn id="5" presetID="1" presetClass="mediacall" presetSubtype="0" fill="hold" nodeType="clickEffect">
+                                  <p:stCondLst>
+                                    <p:cond delay="0"/>
+                                  </p:stCondLst>
+                                  <p:childTnLst>
+                                    <p:cmd type="call" cmd="playFrom(0.0)">
+                                      <p:cBhvr>
+                                        <p:cTn id="6" dur="20000" fill="hold"/>
+                                        <p:tgtEl>
+                                          <p:spTgt spid="4"/>
+                                        </p:tgtEl>
+                                      </p:cBhvr>
+                                    </p:cmd>
+                                  </p:childTnLst>
+                                </p:cTn>
+                              </p:par>
+                            </p:childTnLst>
+                          </p:cTn>
+                        </p:par>
+                      </p:childTnLst>
+                    </p:cTn>
+                  </p:par>
+                </p:childTnLst>
+              </p:cTn>
+              <p:prevCondLst>
+                <p:cond evt="onPrev" delay="0">
+                  <p:tgtEl>
+                    <p:sldTgt/>
+                  </p:tgtEl>
+                </p:cond>
+              </p:prevCondLst>
+              <p:nextCondLst>
+                <p:cond evt="onNext" delay="0">
+                  <p:tgtEl>
+                    <p:sldTgt/>
+                  </p:tgtEl>
+                </p:cond>
+              </p:nextCondLst>
+            </p:seq>
+            <p:video>
+              <p:cMediaNode vol="80000">
+                <p:cTn id="7" fill="hold" display="0">
+                  <p:stCondLst>
+                    <p:cond delay="indefinite"/>
+                  </p:stCondLst>
+                </p:cTn>
+                <p:tgtEl>
+                  <p:spTgt spid="4"/>
+                </p:tgtEl>
+              </p:cMediaNode>
+            </p:video>
+            <p:seq concurrent="1" nextAc="seek">
+              <p:cTn id="8" restart="whenNotActive" fill="hold" evtFilter="cancelBubble" nodeType="interactiveSeq">
+                <p:stCondLst>
+                  <p:cond evt="onClick" delay="0">
+                    <p:tgtEl>
+                      <p:spTgt spid="4"/>
+                    </p:tgtEl>
+                  </p:cond>
+                </p:stCondLst>
+                <p:endSync evt="end" delay="0">
+                  <p:rtn val="all"/>
+                </p:endSync>
+                <p:childTnLst>
+                  <p:par>
+                    <p:cTn id="9" fill="hold">
+                      <p:stCondLst>
+                        <p:cond delay="0"/>
+                      </p:stCondLst>
+                      <p:childTnLst>
+                        <p:par>
+                          <p:cTn id="10" fill="hold">
+                            <p:stCondLst>
+                              <p:cond delay="0"/>
+                            </p:stCondLst>
+                            <p:childTnLst>
+                              <p:par>
+                                <p:cTn id="11" presetID="2" presetClass="mediacall" presetSubtype="0" fill="hold" nodeType="clickEffect">
+                                  <p:stCondLst>
+                                    <p:cond delay="0"/>
+                                  </p:stCondLst>
+                                  <p:childTnLst>
+                                    <p:cmd type="call" cmd="togglePause">
+                                      <p:cBhvr>
+                                        <p:cTn id="12" dur="1" fill="hold"/>
+                                        <p:tgtEl>
+                                          <p:spTgt spid="4"/>
+                                        </p:tgtEl>
+                                      </p:cBhvr>
+                                    </p:cmd>
+                                  </p:childTnLst>
+                                </p:cTn>
+                              </p:par>
+                            </p:childTnLst>
+                          </p:cTn>
+                        </p:par>
+                      </p:childTnLst>
+                    </p:cTn>
+                  </p:par>
+                </p:childTnLst>
+              </p:cTn>
+              <p:nextCondLst>
+                <p:cond evt="onClick" delay="0">
+                  <p:tgtEl>
+                    <p:spTgt spid="4"/>
+                  </p:tgtEl>
+                </p:cond>
+              </p:nextCondLst>
+            </p:seq>
+          </p:childTnLst>
+        </p:cTn>
+      </p:par>
+    </p:tnLst>
+  </p:timing>
 </p:sld>
 </file>
 
@@ -3997,7 +4343,7 @@
           <p:cNvPr id="2" name="Title 1">
             <a:extLst>
               <a:ext uri="{FF2B5EF4-FFF2-40B4-BE49-F238E27FC236}">
-                <a16:creationId xmlns:a16="http://schemas.microsoft.com/office/drawing/2014/main" id="{21B2DD74-C9EA-E8C7-72CB-7E4928066110}"/>
+                <a16:creationId xmlns:a16="http://schemas.microsoft.com/office/drawing/2014/main" id="{D72FD668-0004-5639-2089-9BE7DBB07204}"/>
               </a:ext>
             </a:extLst>
           </p:cNvPr>
@@ -4015,7 +4361,7 @@
           <a:p>
             <a:r>
               <a:rPr lang="en-US" dirty="0"/>
-              <a:t>Fixing bugs </a:t>
+              <a:t>Memory limit</a:t>
             </a:r>
           </a:p>
         </p:txBody>
@@ -4025,7 +4371,7 @@
           <p:cNvPr id="3" name="Content Placeholder 2">
             <a:extLst>
               <a:ext uri="{FF2B5EF4-FFF2-40B4-BE49-F238E27FC236}">
-                <a16:creationId xmlns:a16="http://schemas.microsoft.com/office/drawing/2014/main" id="{5554FD92-2982-74C4-6AB5-BE82F09B92B2}"/>
+                <a16:creationId xmlns:a16="http://schemas.microsoft.com/office/drawing/2014/main" id="{9188BEF5-D2F5-7E7C-6E95-981555CA51AD}"/>
               </a:ext>
             </a:extLst>
           </p:cNvPr>
@@ -4036,15 +4382,10 @@
             <p:ph idx="1"/>
           </p:nvPr>
         </p:nvSpPr>
-        <p:spPr>
-          <a:xfrm>
-            <a:off x="838200" y="1825625"/>
-            <a:ext cx="10515600" cy="4897664"/>
-          </a:xfrm>
-        </p:spPr>
+        <p:spPr/>
         <p:txBody>
           <a:bodyPr>
-            <a:normAutofit/>
+            <a:normAutofit lnSpcReduction="10000"/>
           </a:bodyPr>
           <a:lstStyle/>
           <a:p>
@@ -4052,8 +4393,16 @@
               <a:buNone/>
             </a:pPr>
             <a:r>
-              <a:rPr lang="en-US" sz="2000" dirty="0"/>
-              <a:t>What I thought I was doing:</a:t>
+              <a:rPr lang="en-US" dirty="0"/>
+              <a:t>What </a:t>
+            </a:r>
+            <a:r>
+              <a:rPr lang="en-US" b="1" dirty="0"/>
+              <a:t>does</a:t>
+            </a:r>
+            <a:r>
+              <a:rPr lang="en-US" dirty="0"/>
+              <a:t> influences the limit:</a:t>
             </a:r>
           </a:p>
           <a:p>
@@ -4061,23 +4410,31 @@
               <a:buNone/>
             </a:pPr>
             <a:r>
-              <a:rPr lang="en-US" sz="2000" dirty="0"/>
-              <a:t>Sampling the initial parameters for each neuron from a normal distribution with means (-3, -3, 0, 0) and standard deviation of 1. </a:t>
+              <a:rPr lang="en-US" dirty="0"/>
+              <a:t>Number of neurons, batch size</a:t>
             </a:r>
           </a:p>
           <a:p>
             <a:pPr marL="0" indent="0">
               <a:buNone/>
             </a:pPr>
-            <a:endParaRPr lang="en-US" sz="2000" dirty="0"/>
+            <a:endParaRPr lang="en-US" dirty="0"/>
           </a:p>
           <a:p>
             <a:pPr marL="0" indent="0">
               <a:buNone/>
             </a:pPr>
             <a:r>
-              <a:rPr lang="en-US" sz="2000" dirty="0"/>
-              <a:t>What I was actually doing: </a:t>
+              <a:rPr lang="en-US" dirty="0"/>
+              <a:t>What </a:t>
+            </a:r>
+            <a:r>
+              <a:rPr lang="en-US" b="1" dirty="0"/>
+              <a:t>doesn’t</a:t>
+            </a:r>
+            <a:r>
+              <a:rPr lang="en-US" dirty="0"/>
+              <a:t> influence the limit:</a:t>
             </a:r>
           </a:p>
           <a:p>
@@ -4085,32 +4442,32 @@
               <a:buNone/>
             </a:pPr>
             <a:r>
-              <a:rPr lang="en-US" sz="2000" dirty="0"/>
-              <a:t>All parameters but d were initialized to be the same for each neuron.</a:t>
+              <a:rPr lang="en-US" dirty="0"/>
+              <a:t>Kernel size, number of channels</a:t>
             </a:r>
           </a:p>
           <a:p>
             <a:pPr marL="0" indent="0">
               <a:buNone/>
             </a:pPr>
-            <a:r>
-              <a:rPr lang="en-US" sz="2000" dirty="0"/>
-              <a:t>d was drawn from a normal distribution with mean = 0 and std = 1.  </a:t>
-            </a:r>
+            <a:endParaRPr lang="en-US" dirty="0"/>
           </a:p>
           <a:p>
             <a:pPr marL="0" indent="0">
               <a:buNone/>
             </a:pPr>
-            <a:endParaRPr lang="en-US" sz="2000" dirty="0"/>
+            <a:r>
+              <a:rPr lang="en-US" dirty="0"/>
+              <a:t>Why is that?</a:t>
+            </a:r>
           </a:p>
           <a:p>
             <a:pPr marL="0" indent="0">
               <a:buNone/>
             </a:pPr>
             <a:r>
-              <a:rPr lang="en-US" sz="2000" dirty="0"/>
-              <a:t>What I’m doing now</a:t>
+              <a:rPr lang="en-US" dirty="0"/>
+              <a:t>It would be possible to run 1000 neurons with a batch size of 16.</a:t>
             </a:r>
           </a:p>
           <a:p>
@@ -4118,17 +4475,8 @@
               <a:buNone/>
             </a:pPr>
             <a:r>
-              <a:rPr lang="en-US" sz="2000" dirty="0"/>
-              <a:t>Sampling initial parameters from each neuron from a normal distribution with means that correspond to the converged parameter values and std = 1. </a:t>
-            </a:r>
-          </a:p>
-          <a:p>
-            <a:pPr marL="0" indent="0">
-              <a:buNone/>
-            </a:pPr>
-            <a:r>
-              <a:rPr lang="en-US" sz="2000" b="1" i="1" dirty="0"/>
-              <a:t>Unfortunately, that didn’t fix the mosaics</a:t>
+              <a:rPr lang="en-US" dirty="0"/>
+              <a:t>For 3M epochs, it would take ~55 hours. </a:t>
             </a:r>
           </a:p>
         </p:txBody>
@@ -4136,7 +4484,7 @@
     </p:spTree>
     <p:extLst>
       <p:ext uri="{BB962C8B-B14F-4D97-AF65-F5344CB8AC3E}">
-        <p14:creationId xmlns:p14="http://schemas.microsoft.com/office/powerpoint/2010/main" val="3481433793"/>
+        <p14:creationId xmlns:p14="http://schemas.microsoft.com/office/powerpoint/2010/main" val="1932711536"/>
       </p:ext>
     </p:extLst>
   </p:cSld>
@@ -4168,7 +4516,7 @@
           <p:cNvPr id="2" name="Title 1">
             <a:extLst>
               <a:ext uri="{FF2B5EF4-FFF2-40B4-BE49-F238E27FC236}">
-                <a16:creationId xmlns:a16="http://schemas.microsoft.com/office/drawing/2014/main" id="{12B9F974-A565-6C88-FC98-5FDAEC76C3C8}"/>
+                <a16:creationId xmlns:a16="http://schemas.microsoft.com/office/drawing/2014/main" id="{21B2DD74-C9EA-E8C7-72CB-7E4928066110}"/>
               </a:ext>
             </a:extLst>
           </p:cNvPr>
@@ -4186,7 +4534,7 @@
           <a:p>
             <a:r>
               <a:rPr lang="en-US" dirty="0"/>
-              <a:t>Fixing this bug does not fix mosaic problem </a:t>
+              <a:t>Fixing bugs </a:t>
             </a:r>
           </a:p>
         </p:txBody>
@@ -4196,7 +4544,7 @@
           <p:cNvPr id="3" name="Content Placeholder 2">
             <a:extLst>
               <a:ext uri="{FF2B5EF4-FFF2-40B4-BE49-F238E27FC236}">
-                <a16:creationId xmlns:a16="http://schemas.microsoft.com/office/drawing/2014/main" id="{D61E9DCF-77D4-86F5-810E-D58C5D9631D0}"/>
+                <a16:creationId xmlns:a16="http://schemas.microsoft.com/office/drawing/2014/main" id="{5554FD92-2982-74C4-6AB5-BE82F09B92B2}"/>
               </a:ext>
             </a:extLst>
           </p:cNvPr>
@@ -4207,19 +4555,107 @@
             <p:ph idx="1"/>
           </p:nvPr>
         </p:nvSpPr>
-        <p:spPr/>
-        <p:txBody>
-          <a:bodyPr/>
-          <a:lstStyle/>
-          <a:p>
-            <a:endParaRPr lang="en-US"/>
+        <p:spPr>
+          <a:xfrm>
+            <a:off x="838200" y="1825625"/>
+            <a:ext cx="10515600" cy="4897664"/>
+          </a:xfrm>
+        </p:spPr>
+        <p:txBody>
+          <a:bodyPr>
+            <a:normAutofit/>
+          </a:bodyPr>
+          <a:lstStyle/>
+          <a:p>
+            <a:pPr marL="0" indent="0">
+              <a:buNone/>
+            </a:pPr>
+            <a:r>
+              <a:rPr lang="en-US" sz="2000" dirty="0"/>
+              <a:t>What I thought I was doing:</a:t>
+            </a:r>
+          </a:p>
+          <a:p>
+            <a:pPr marL="0" indent="0">
+              <a:buNone/>
+            </a:pPr>
+            <a:r>
+              <a:rPr lang="en-US" sz="2000" dirty="0"/>
+              <a:t>Sampling the initial parameters for each neuron from a normal distribution with means (-3, -3, 0, 0) and standard deviation of 1. </a:t>
+            </a:r>
+          </a:p>
+          <a:p>
+            <a:pPr marL="0" indent="0">
+              <a:buNone/>
+            </a:pPr>
+            <a:endParaRPr lang="en-US" sz="2000" dirty="0"/>
+          </a:p>
+          <a:p>
+            <a:pPr marL="0" indent="0">
+              <a:buNone/>
+            </a:pPr>
+            <a:r>
+              <a:rPr lang="en-US" sz="2000" dirty="0"/>
+              <a:t>What I was actually doing: </a:t>
+            </a:r>
+          </a:p>
+          <a:p>
+            <a:pPr marL="0" indent="0">
+              <a:buNone/>
+            </a:pPr>
+            <a:r>
+              <a:rPr lang="en-US" sz="2000" dirty="0"/>
+              <a:t>All parameters but d were initialized to be the same for each neuron.</a:t>
+            </a:r>
+          </a:p>
+          <a:p>
+            <a:pPr marL="0" indent="0">
+              <a:buNone/>
+            </a:pPr>
+            <a:r>
+              <a:rPr lang="en-US" sz="2000" dirty="0"/>
+              <a:t>d was drawn from a normal distribution with mean = 0 and std = 1.  </a:t>
+            </a:r>
+          </a:p>
+          <a:p>
+            <a:pPr marL="0" indent="0">
+              <a:buNone/>
+            </a:pPr>
+            <a:endParaRPr lang="en-US" sz="2000" dirty="0"/>
+          </a:p>
+          <a:p>
+            <a:pPr marL="0" indent="0">
+              <a:buNone/>
+            </a:pPr>
+            <a:r>
+              <a:rPr lang="en-US" sz="2000" dirty="0"/>
+              <a:t>What I’m doing now</a:t>
+            </a:r>
+          </a:p>
+          <a:p>
+            <a:pPr marL="0" indent="0">
+              <a:buNone/>
+            </a:pPr>
+            <a:r>
+              <a:rPr lang="en-US" sz="2000" dirty="0"/>
+              <a:t>Sampling initial parameters from each neuron from a normal distribution with means that correspond to the converged parameter values and std = 1. </a:t>
+            </a:r>
+          </a:p>
+          <a:p>
+            <a:pPr marL="0" indent="0">
+              <a:buNone/>
+            </a:pPr>
+            <a:r>
+              <a:rPr lang="en-US" sz="2000" b="1" i="1" dirty="0"/>
+              <a:t>Unfortunately, that didn’t fix the mosaics</a:t>
+            </a:r>
           </a:p>
         </p:txBody>
       </p:sp>
     </p:spTree>
     <p:extLst>
       <p:ext uri="{BB962C8B-B14F-4D97-AF65-F5344CB8AC3E}">
-        <p14:creationId xmlns:p14="http://schemas.microsoft.com/office/powerpoint/2010/main" val="4188055202"/>
+        <p14:creationId xmlns:p14="http://schemas.microsoft.com/office/powerpoint/2010/main" val="3481433793"/>
       </p:ext>
     </p:extLst>
   </p:cSld>

</xml_diff>